<commit_message>
Figure Updates, Tree Updates
</commit_message>
<xml_diff>
--- a/Images/Figures_PPT/Torc1MetaPie.pptx
+++ b/Images/Figures_PPT/Torc1MetaPie.pptx
@@ -307,7 +307,7 @@
           <a:p>
             <a:fld id="{E6744CE3-0875-4B69-89C0-6F72D8139561}" type="datetimeFigureOut">
               <a:rPr lang="en-GB" smtClean="0"/>
-              <a:t>29/07/2025</a:t>
+              <a:t>31/07/2025</a:t>
             </a:fld>
             <a:endParaRPr lang="en-GB"/>
           </a:p>
@@ -477,7 +477,7 @@
           <a:p>
             <a:fld id="{E6744CE3-0875-4B69-89C0-6F72D8139561}" type="datetimeFigureOut">
               <a:rPr lang="en-GB" smtClean="0"/>
-              <a:t>29/07/2025</a:t>
+              <a:t>31/07/2025</a:t>
             </a:fld>
             <a:endParaRPr lang="en-GB"/>
           </a:p>
@@ -723,7 +723,7 @@
           <a:p>
             <a:fld id="{E6744CE3-0875-4B69-89C0-6F72D8139561}" type="datetimeFigureOut">
               <a:rPr lang="en-GB" smtClean="0"/>
-              <a:t>29/07/2025</a:t>
+              <a:t>31/07/2025</a:t>
             </a:fld>
             <a:endParaRPr lang="en-GB"/>
           </a:p>
@@ -1011,7 +1011,7 @@
           <a:p>
             <a:fld id="{E6744CE3-0875-4B69-89C0-6F72D8139561}" type="datetimeFigureOut">
               <a:rPr lang="en-GB" smtClean="0"/>
-              <a:t>29/07/2025</a:t>
+              <a:t>31/07/2025</a:t>
             </a:fld>
             <a:endParaRPr lang="en-GB"/>
           </a:p>
@@ -1433,7 +1433,7 @@
           <a:p>
             <a:fld id="{E6744CE3-0875-4B69-89C0-6F72D8139561}" type="datetimeFigureOut">
               <a:rPr lang="en-GB" smtClean="0"/>
-              <a:t>29/07/2025</a:t>
+              <a:t>31/07/2025</a:t>
             </a:fld>
             <a:endParaRPr lang="en-GB"/>
           </a:p>
@@ -1551,7 +1551,7 @@
           <a:p>
             <a:fld id="{E6744CE3-0875-4B69-89C0-6F72D8139561}" type="datetimeFigureOut">
               <a:rPr lang="en-GB" smtClean="0"/>
-              <a:t>29/07/2025</a:t>
+              <a:t>31/07/2025</a:t>
             </a:fld>
             <a:endParaRPr lang="en-GB"/>
           </a:p>
@@ -1646,7 +1646,7 @@
           <a:p>
             <a:fld id="{E6744CE3-0875-4B69-89C0-6F72D8139561}" type="datetimeFigureOut">
               <a:rPr lang="en-GB" smtClean="0"/>
-              <a:t>29/07/2025</a:t>
+              <a:t>31/07/2025</a:t>
             </a:fld>
             <a:endParaRPr lang="en-GB"/>
           </a:p>
@@ -1859,7 +1859,7 @@
           <a:p>
             <a:fld id="{E6744CE3-0875-4B69-89C0-6F72D8139561}" type="datetimeFigureOut">
               <a:rPr lang="en-GB" smtClean="0"/>
-              <a:t>29/07/2025</a:t>
+              <a:t>31/07/2025</a:t>
             </a:fld>
             <a:endParaRPr lang="en-GB"/>
           </a:p>
@@ -4121,7 +4121,7 @@
                 </a:spcAft>
               </a:pPr>
               <a:r>
-                <a:rPr lang="en-US" sz="3600" dirty="0" err="1">
+                <a:rPr lang="en-US" sz="3600" dirty="0">
                   <a:solidFill>
                     <a:srgbClr val="000000">
                       <a:alpha val="100000"/>
@@ -4130,7 +4130,7 @@
                   <a:latin typeface="Aptos" panose="020B0004020202020204" pitchFamily="34" charset="0"/>
                   <a:cs typeface="Times New Roman" panose="02020603050405020304" pitchFamily="18" charset="0"/>
                 </a:rPr>
-                <a:t>Endosymbiote</a:t>
+                <a:t>Endosymbiont</a:t>
               </a:r>
               <a:r>
                 <a:rPr sz="3600" dirty="0">

</xml_diff>